<commit_message>
registre solucionat amb el ranking
</commit_message>
<xml_diff>
--- a/Docs/Visual Memory.pptx
+++ b/Docs/Visual Memory.pptx
@@ -3334,13 +3334,12 @@
             </a:r>
             <a:r>
               <a:rPr lang="ca-ES" sz="2400" dirty="0" smtClean="0"/>
-              <a:t> BBDD( en local )</a:t>
-            </a:r>
-          </a:p>
-          <a:p>
-            <a:pPr marL="0" indent="0">
-              <a:buNone/>
-            </a:pPr>
+              <a:t> </a:t>
+            </a:r>
+            <a:r>
+              <a:rPr lang="ca-ES" sz="2400" dirty="0" smtClean="0"/>
+              <a:t>BBDD</a:t>
+            </a:r>
             <a:endParaRPr lang="ca-ES" dirty="0" smtClean="0"/>
           </a:p>
           <a:p>
@@ -3557,7 +3556,7 @@
         </p:blipFill>
         <p:spPr bwMode="auto">
           <a:xfrm>
-            <a:off x="4716016" y="2558434"/>
+            <a:off x="5004048" y="2810099"/>
             <a:ext cx="1651547" cy="1732505"/>
           </a:xfrm>
           <a:prstGeom prst="rect">

</xml_diff>